<commit_message>
【add】the NIO demo from web
</commit_message>
<xml_diff>
--- a/io/IO.pptx
+++ b/io/IO.pptx
@@ -9,6 +9,14 @@
     <p:sldId id="268" r:id="rId4"/>
     <p:sldId id="269" r:id="rId5"/>
     <p:sldId id="270" r:id="rId6"/>
+    <p:sldId id="271" r:id="rId7"/>
+    <p:sldId id="272" r:id="rId8"/>
+    <p:sldId id="273" r:id="rId9"/>
+    <p:sldId id="274" r:id="rId10"/>
+    <p:sldId id="275" r:id="rId11"/>
+    <p:sldId id="276" r:id="rId12"/>
+    <p:sldId id="278" r:id="rId13"/>
+    <p:sldId id="277" r:id="rId14"/>
   </p:sldIdLst>
   <p:sldSz cx="12192000" cy="6858000"/>
   <p:notesSz cx="6858000" cy="9144000"/>
@@ -2965,6 +2973,243 @@
 </p:sld>
 </file>
 
+<file path=ppt/slides/slide10.xml><?xml version="1.0" encoding="utf-8"?>
+<p:sld xmlns:a="http://schemas.openxmlformats.org/drawingml/2006/main" xmlns:r="http://schemas.openxmlformats.org/officeDocument/2006/relationships" xmlns:p="http://schemas.openxmlformats.org/presentationml/2006/main">
+  <p:cSld>
+    <p:spTree>
+      <p:nvGrpSpPr>
+        <p:cNvPr id="1" name=""/>
+        <p:cNvGrpSpPr/>
+        <p:nvPr/>
+      </p:nvGrpSpPr>
+      <p:grpSpPr/>
+      <p:sp>
+        <p:nvSpPr>
+          <p:cNvPr id="2" name="标题 1"/>
+          <p:cNvSpPr>
+            <a:spLocks noGrp="1"/>
+          </p:cNvSpPr>
+          <p:nvPr>
+            <p:ph type="title"/>
+          </p:nvPr>
+        </p:nvSpPr>
+        <p:spPr/>
+        <p:txBody>
+          <a:bodyPr>
+            <a:normAutofit/>
+          </a:bodyPr>
+          <a:p>
+            <a:r>
+              <a:rPr lang="en-US" altLang="zh-CN"/>
+              <a:t>Java NIO Buffer  </a:t>
+            </a:r>
+            <a:r>
+              <a:rPr lang="zh-CN" altLang="en-US">
+                <a:sym typeface="+mn-ea"/>
+              </a:rPr>
+              <a:t>equals()</a:t>
+            </a:r>
+            <a:endParaRPr lang="en-US" altLang="zh-CN"/>
+          </a:p>
+        </p:txBody>
+      </p:sp>
+      <p:sp>
+        <p:nvSpPr>
+          <p:cNvPr id="3" name="内容占位符 2"/>
+          <p:cNvSpPr>
+            <a:spLocks noGrp="1"/>
+          </p:cNvSpPr>
+          <p:nvPr>
+            <p:ph idx="1"/>
+          </p:nvPr>
+        </p:nvSpPr>
+        <p:spPr/>
+        <p:txBody>
+          <a:bodyPr/>
+          <a:p>
+            <a:pPr marL="0" indent="0">
+              <a:buNone/>
+            </a:pPr>
+            <a:r>
+              <a:rPr lang="zh-CN" altLang="en-US"/>
+              <a:t>Two buffers are equal if:</a:t>
+            </a:r>
+            <a:endParaRPr lang="zh-CN" altLang="en-US"/>
+          </a:p>
+          <a:p>
+            <a:r>
+              <a:rPr lang="zh-CN" altLang="en-US"/>
+              <a:t>They are of the same type (byte, char, int etc.)</a:t>
+            </a:r>
+            <a:endParaRPr lang="zh-CN" altLang="en-US"/>
+          </a:p>
+          <a:p>
+            <a:r>
+              <a:rPr lang="zh-CN" altLang="en-US"/>
+              <a:t>They have the same amount of remaining bytes, chars etc. in the buffer.</a:t>
+            </a:r>
+            <a:endParaRPr lang="zh-CN" altLang="en-US"/>
+          </a:p>
+          <a:p>
+            <a:r>
+              <a:rPr lang="zh-CN" altLang="en-US"/>
+              <a:t>All remaining bytes, chars etc. are equal.</a:t>
+            </a:r>
+            <a:endParaRPr lang="zh-CN" altLang="en-US"/>
+          </a:p>
+        </p:txBody>
+      </p:sp>
+    </p:spTree>
+  </p:cSld>
+  <p:clrMapOvr>
+    <a:masterClrMapping/>
+  </p:clrMapOvr>
+</p:sld>
+</file>
+
+<file path=ppt/slides/slide11.xml><?xml version="1.0" encoding="utf-8"?>
+<p:sld xmlns:a="http://schemas.openxmlformats.org/drawingml/2006/main" xmlns:r="http://schemas.openxmlformats.org/officeDocument/2006/relationships" xmlns:p="http://schemas.openxmlformats.org/presentationml/2006/main">
+  <p:cSld>
+    <p:spTree>
+      <p:nvGrpSpPr>
+        <p:cNvPr id="1" name=""/>
+        <p:cNvGrpSpPr/>
+        <p:nvPr/>
+      </p:nvGrpSpPr>
+      <p:grpSpPr/>
+      <p:sp>
+        <p:nvSpPr>
+          <p:cNvPr id="2" name="标题 1"/>
+          <p:cNvSpPr>
+            <a:spLocks noGrp="1"/>
+          </p:cNvSpPr>
+          <p:nvPr>
+            <p:ph type="title"/>
+          </p:nvPr>
+        </p:nvSpPr>
+        <p:spPr/>
+        <p:txBody>
+          <a:bodyPr>
+            <a:normAutofit/>
+          </a:bodyPr>
+          <a:p>
+            <a:r>
+              <a:rPr lang="en-US" altLang="zh-CN"/>
+              <a:t>Java NIO Buffer  </a:t>
+            </a:r>
+            <a:r>
+              <a:rPr lang="zh-CN" altLang="en-US">
+                <a:sym typeface="+mn-ea"/>
+              </a:rPr>
+              <a:t>compareTo()</a:t>
+            </a:r>
+            <a:endParaRPr lang="zh-CN" altLang="en-US">
+              <a:sym typeface="+mn-ea"/>
+            </a:endParaRPr>
+          </a:p>
+        </p:txBody>
+      </p:sp>
+      <p:sp>
+        <p:nvSpPr>
+          <p:cNvPr id="3" name="内容占位符 2"/>
+          <p:cNvSpPr>
+            <a:spLocks noGrp="1"/>
+          </p:cNvSpPr>
+          <p:nvPr>
+            <p:ph idx="1"/>
+          </p:nvPr>
+        </p:nvSpPr>
+        <p:spPr/>
+        <p:txBody>
+          <a:bodyPr/>
+          <a:p>
+            <a:pPr marL="0" indent="0">
+              <a:buNone/>
+            </a:pPr>
+            <a:r>
+              <a:rPr lang="zh-CN" altLang="en-US"/>
+              <a:t>A buffer is considered "smaller" than another buffer if:</a:t>
+            </a:r>
+            <a:endParaRPr lang="zh-CN" altLang="en-US"/>
+          </a:p>
+          <a:p>
+            <a:r>
+              <a:rPr lang="zh-CN" altLang="en-US"/>
+              <a:t>The first element which is equal to the corresponding element in the other buffer, is smaller than that in the other buffer.</a:t>
+            </a:r>
+            <a:endParaRPr lang="zh-CN" altLang="en-US"/>
+          </a:p>
+          <a:p>
+            <a:r>
+              <a:rPr lang="zh-CN" altLang="en-US"/>
+              <a:t>All elements are equal, but the first buffer runs out of elements before the second buffer does (it has fewer elements).</a:t>
+            </a:r>
+            <a:endParaRPr lang="zh-CN" altLang="en-US"/>
+          </a:p>
+        </p:txBody>
+      </p:sp>
+    </p:spTree>
+  </p:cSld>
+  <p:clrMapOvr>
+    <a:masterClrMapping/>
+  </p:clrMapOvr>
+</p:sld>
+</file>
+
+<file path=ppt/slides/slide12.xml><?xml version="1.0" encoding="utf-8"?>
+<p:sld xmlns:a="http://schemas.openxmlformats.org/drawingml/2006/main" xmlns:r="http://schemas.openxmlformats.org/officeDocument/2006/relationships" xmlns:p="http://schemas.openxmlformats.org/presentationml/2006/main">
+  <p:cSld>
+    <p:spTree>
+      <p:nvGrpSpPr>
+        <p:cNvPr id="1" name=""/>
+        <p:cNvGrpSpPr/>
+        <p:nvPr/>
+      </p:nvGrpSpPr>
+      <p:grpSpPr/>
+      <p:sp>
+        <p:nvSpPr>
+          <p:cNvPr id="2" name="标题 1"/>
+          <p:cNvSpPr>
+            <a:spLocks noGrp="1"/>
+          </p:cNvSpPr>
+          <p:nvPr>
+            <p:ph type="title"/>
+          </p:nvPr>
+        </p:nvSpPr>
+        <p:spPr/>
+        <p:txBody>
+          <a:bodyPr/>
+          <a:p>
+            <a:endParaRPr lang="zh-CN" altLang="en-US"/>
+          </a:p>
+        </p:txBody>
+      </p:sp>
+      <p:sp>
+        <p:nvSpPr>
+          <p:cNvPr id="3" name="内容占位符 2"/>
+          <p:cNvSpPr>
+            <a:spLocks noGrp="1"/>
+          </p:cNvSpPr>
+          <p:nvPr>
+            <p:ph idx="1"/>
+          </p:nvPr>
+        </p:nvSpPr>
+        <p:spPr/>
+        <p:txBody>
+          <a:bodyPr/>
+          <a:p>
+            <a:endParaRPr lang="zh-CN" altLang="en-US"/>
+          </a:p>
+        </p:txBody>
+      </p:sp>
+    </p:spTree>
+  </p:cSld>
+  <p:clrMapOvr>
+    <a:masterClrMapping/>
+  </p:clrMapOvr>
+</p:sld>
+</file>
+
 <file path=ppt/slides/slide2.xml><?xml version="1.0" encoding="utf-8"?>
 <p:sld xmlns:a="http://schemas.openxmlformats.org/drawingml/2006/main" xmlns:r="http://schemas.openxmlformats.org/officeDocument/2006/relationships" xmlns:p="http://schemas.openxmlformats.org/presentationml/2006/main">
   <p:cSld>
@@ -3215,67 +3460,222 @@
           <a:p>
             <a:r>
               <a:rPr lang="en-US" altLang="zh-CN"/>
-              <a:t>Non-blocking IO</a:t>
+              <a:t>Channels &amp; Buffers</a:t>
+            </a:r>
+            <a:endParaRPr lang="zh-CN" altLang="en-US"/>
+          </a:p>
+        </p:txBody>
+      </p:sp>
+      <p:pic>
+        <p:nvPicPr>
+          <p:cNvPr id="5" name="内容占位符 4"/>
+          <p:cNvPicPr>
+            <a:picLocks noChangeAspect="1"/>
+          </p:cNvPicPr>
+          <p:nvPr>
+            <p:ph idx="1"/>
+          </p:nvPr>
+        </p:nvPicPr>
+        <p:blipFill>
+          <a:blip r:embed="rId1"/>
+          <a:stretch>
+            <a:fillRect/>
+          </a:stretch>
+        </p:blipFill>
+        <p:spPr>
+          <a:xfrm>
+            <a:off x="838200" y="2061210"/>
+            <a:ext cx="4292600" cy="2933700"/>
+          </a:xfrm>
+          <a:prstGeom prst="rect">
+            <a:avLst/>
+          </a:prstGeom>
+        </p:spPr>
+      </p:pic>
+      <p:sp>
+        <p:nvSpPr>
+          <p:cNvPr id="6" name="文本框 5"/>
+          <p:cNvSpPr txBox="1"/>
+          <p:nvPr/>
+        </p:nvSpPr>
+        <p:spPr>
+          <a:xfrm>
+            <a:off x="5373370" y="2790190"/>
+            <a:ext cx="2636520" cy="1753235"/>
+          </a:xfrm>
+          <a:prstGeom prst="rect">
+            <a:avLst/>
+          </a:prstGeom>
+          <a:noFill/>
+        </p:spPr>
+        <p:txBody>
+          <a:bodyPr wrap="square" rtlCol="0">
+            <a:spAutoFit/>
+          </a:bodyPr>
+          <a:p>
+            <a:pPr indent="0">
+              <a:buFont typeface="Arial" panose="020B0604020202020204" pitchFamily="34" charset="0"/>
+              <a:buNone/>
+            </a:pPr>
+            <a:r>
+              <a:rPr lang="en-US" altLang="zh-CN"/>
+              <a:t>Below covers UDP + TCP network IO, and file IO.</a:t>
             </a:r>
             <a:endParaRPr lang="en-US" altLang="zh-CN"/>
           </a:p>
-        </p:txBody>
-      </p:sp>
-      <p:sp>
-        <p:nvSpPr>
-          <p:cNvPr id="3" name="内容占位符 2"/>
-          <p:cNvSpPr>
-            <a:spLocks noGrp="1"/>
-          </p:cNvSpPr>
-          <p:nvPr>
-            <p:ph idx="1"/>
-          </p:nvPr>
-        </p:nvSpPr>
-        <p:spPr/>
-        <p:txBody>
-          <a:bodyPr/>
-          <a:p>
+          <a:p>
+            <a:pPr marL="285750" indent="-285750">
+              <a:buFont typeface="Arial" panose="020B0604020202020204" pitchFamily="34" charset="0"/>
+              <a:buChar char="•"/>
+            </a:pPr>
+            <a:r>
+              <a:rPr lang="zh-CN" altLang="en-US"/>
+              <a:t>FileChannel</a:t>
+            </a:r>
+            <a:endParaRPr lang="zh-CN" altLang="en-US"/>
+          </a:p>
+          <a:p>
+            <a:pPr marL="285750" indent="-285750">
+              <a:buFont typeface="Arial" panose="020B0604020202020204" pitchFamily="34" charset="0"/>
+              <a:buChar char="•"/>
+            </a:pPr>
+            <a:r>
+              <a:rPr lang="zh-CN" altLang="en-US"/>
+              <a:t>DatagramChannel</a:t>
+            </a:r>
+            <a:endParaRPr lang="zh-CN" altLang="en-US"/>
+          </a:p>
+          <a:p>
+            <a:pPr marL="285750" indent="-285750">
+              <a:buFont typeface="Arial" panose="020B0604020202020204" pitchFamily="34" charset="0"/>
+              <a:buChar char="•"/>
+            </a:pPr>
+            <a:r>
+              <a:rPr lang="zh-CN" altLang="en-US"/>
+              <a:t>SocketChannel</a:t>
+            </a:r>
+            <a:endParaRPr lang="zh-CN" altLang="en-US"/>
+          </a:p>
+          <a:p>
+            <a:pPr marL="285750" indent="-285750">
+              <a:buFont typeface="Arial" panose="020B0604020202020204" pitchFamily="34" charset="0"/>
+              <a:buChar char="•"/>
+            </a:pPr>
+            <a:r>
+              <a:rPr lang="zh-CN" altLang="en-US"/>
+              <a:t>ServerSocketChannel</a:t>
+            </a:r>
+            <a:endParaRPr lang="zh-CN" altLang="en-US"/>
+          </a:p>
+        </p:txBody>
+      </p:sp>
+      <p:sp>
+        <p:nvSpPr>
+          <p:cNvPr id="7" name="文本框 6"/>
+          <p:cNvSpPr txBox="1"/>
+          <p:nvPr/>
+        </p:nvSpPr>
+        <p:spPr>
+          <a:xfrm>
+            <a:off x="8263255" y="1579880"/>
+            <a:ext cx="2636520" cy="3415030"/>
+          </a:xfrm>
+          <a:prstGeom prst="rect">
+            <a:avLst/>
+          </a:prstGeom>
+          <a:noFill/>
+        </p:spPr>
+        <p:txBody>
+          <a:bodyPr wrap="square" rtlCol="0">
+            <a:spAutoFit/>
+          </a:bodyPr>
+          <a:p>
+            <a:pPr indent="0">
+              <a:buFont typeface="Arial" panose="020B0604020202020204" pitchFamily="34" charset="0"/>
+              <a:buNone/>
+            </a:pPr>
             <a:r>
               <a:rPr lang="en-US" altLang="zh-CN"/>
-              <a:t>Java NIO</a:t>
-            </a:r>
-            <a:r>
-              <a:rPr lang="zh-CN" altLang="en-US"/>
-              <a:t>让我们可以实现非阻塞</a:t>
-            </a:r>
+              <a:t>Below cover the basic data types that you can send via IO: byte, short, int, long, float, double and characters.</a:t>
+            </a:r>
+            <a:endParaRPr lang="en-US" altLang="zh-CN"/>
+          </a:p>
+          <a:p>
+            <a:pPr marL="285750" indent="-285750">
+              <a:buFont typeface="Arial" panose="020B0604020202020204" pitchFamily="34" charset="0"/>
+              <a:buChar char="•"/>
+            </a:pPr>
             <a:r>
               <a:rPr lang="en-US" altLang="zh-CN"/>
-              <a:t>IO</a:t>
-            </a:r>
-            <a:r>
-              <a:rPr lang="zh-CN" altLang="en-US"/>
-              <a:t>，即对</a:t>
-            </a:r>
+              <a:t>ByteBuffer</a:t>
+            </a:r>
+            <a:endParaRPr lang="en-US" altLang="zh-CN"/>
+          </a:p>
+          <a:p>
+            <a:pPr marL="285750" indent="-285750">
+              <a:buFont typeface="Arial" panose="020B0604020202020204" pitchFamily="34" charset="0"/>
+              <a:buChar char="•"/>
+            </a:pPr>
             <a:r>
               <a:rPr lang="en-US" altLang="zh-CN"/>
-              <a:t>Channel</a:t>
-            </a:r>
-            <a:r>
-              <a:rPr lang="zh-CN" altLang="en-US"/>
-              <a:t>进行</a:t>
-            </a:r>
+              <a:t>CharBuffer</a:t>
+            </a:r>
+            <a:endParaRPr lang="en-US" altLang="zh-CN"/>
+          </a:p>
+          <a:p>
+            <a:pPr marL="285750" indent="-285750">
+              <a:buFont typeface="Arial" panose="020B0604020202020204" pitchFamily="34" charset="0"/>
+              <a:buChar char="•"/>
+            </a:pPr>
             <a:r>
               <a:rPr lang="en-US" altLang="zh-CN"/>
-              <a:t>IO</a:t>
-            </a:r>
-            <a:r>
-              <a:rPr lang="zh-CN" altLang="en-US"/>
-              <a:t>请求后，立刻返回做其他逻辑，</a:t>
-            </a:r>
+              <a:t>DoubleBuffer</a:t>
+            </a:r>
+            <a:endParaRPr lang="en-US" altLang="zh-CN"/>
+          </a:p>
+          <a:p>
+            <a:pPr marL="285750" indent="-285750">
+              <a:buFont typeface="Arial" panose="020B0604020202020204" pitchFamily="34" charset="0"/>
+              <a:buChar char="•"/>
+            </a:pPr>
             <a:r>
               <a:rPr lang="en-US" altLang="zh-CN"/>
-              <a:t>Data is read into the buffer </a:t>
-            </a:r>
-            <a:r>
-              <a:rPr lang="zh-CN" altLang="en-US"/>
-              <a:t>。</a:t>
-            </a:r>
-            <a:endParaRPr lang="zh-CN" altLang="en-US"/>
+              <a:t>FloatBuffer</a:t>
+            </a:r>
+            <a:endParaRPr lang="en-US" altLang="zh-CN"/>
+          </a:p>
+          <a:p>
+            <a:pPr marL="285750" indent="-285750">
+              <a:buFont typeface="Arial" panose="020B0604020202020204" pitchFamily="34" charset="0"/>
+              <a:buChar char="•"/>
+            </a:pPr>
+            <a:r>
+              <a:rPr lang="en-US" altLang="zh-CN"/>
+              <a:t>IntBuffer</a:t>
+            </a:r>
+            <a:endParaRPr lang="en-US" altLang="zh-CN"/>
+          </a:p>
+          <a:p>
+            <a:pPr marL="285750" indent="-285750">
+              <a:buFont typeface="Arial" panose="020B0604020202020204" pitchFamily="34" charset="0"/>
+              <a:buChar char="•"/>
+            </a:pPr>
+            <a:r>
+              <a:rPr lang="en-US" altLang="zh-CN"/>
+              <a:t>LongBuffer</a:t>
+            </a:r>
+            <a:endParaRPr lang="en-US" altLang="zh-CN"/>
+          </a:p>
+          <a:p>
+            <a:pPr marL="285750" indent="-285750">
+              <a:buFont typeface="Arial" panose="020B0604020202020204" pitchFamily="34" charset="0"/>
+              <a:buChar char="•"/>
+            </a:pPr>
+            <a:r>
+              <a:rPr lang="en-US" altLang="zh-CN"/>
+              <a:t>ShortBuffer</a:t>
+            </a:r>
+            <a:endParaRPr lang="en-US" altLang="zh-CN"/>
           </a:p>
         </p:txBody>
       </p:sp>
@@ -3313,12 +3713,107 @@
           <a:p>
             <a:r>
               <a:rPr lang="en-US" altLang="zh-CN"/>
-              <a:t>Selector</a:t>
+              <a:t>Selectors</a:t>
             </a:r>
             <a:endParaRPr lang="en-US" altLang="zh-CN"/>
           </a:p>
         </p:txBody>
       </p:sp>
+      <p:pic>
+        <p:nvPicPr>
+          <p:cNvPr id="4" name="内容占位符 3"/>
+          <p:cNvPicPr>
+            <a:picLocks noChangeAspect="1"/>
+          </p:cNvPicPr>
+          <p:nvPr>
+            <p:ph idx="1"/>
+          </p:nvPr>
+        </p:nvPicPr>
+        <p:blipFill>
+          <a:blip r:embed="rId1"/>
+          <a:stretch>
+            <a:fillRect/>
+          </a:stretch>
+        </p:blipFill>
+        <p:spPr>
+          <a:xfrm>
+            <a:off x="838200" y="1899285"/>
+            <a:ext cx="5181600" cy="4102100"/>
+          </a:xfrm>
+          <a:prstGeom prst="rect">
+            <a:avLst/>
+          </a:prstGeom>
+        </p:spPr>
+      </p:pic>
+      <p:sp>
+        <p:nvSpPr>
+          <p:cNvPr id="5" name="文本框 4"/>
+          <p:cNvSpPr txBox="1"/>
+          <p:nvPr/>
+        </p:nvSpPr>
+        <p:spPr>
+          <a:xfrm>
+            <a:off x="6463030" y="2186305"/>
+            <a:ext cx="5120005" cy="1753235"/>
+          </a:xfrm>
+          <a:prstGeom prst="rect">
+            <a:avLst/>
+          </a:prstGeom>
+          <a:noFill/>
+        </p:spPr>
+        <p:txBody>
+          <a:bodyPr wrap="square" rtlCol="0">
+            <a:spAutoFit/>
+          </a:bodyPr>
+          <a:p>
+            <a:r>
+              <a:rPr lang="zh-CN" altLang="en-US"/>
+              <a:t>To use a Selector you register the Channel's with it. Then you call it's select() method. This method will block until there is an event ready for one of the registered channels. Once the method returns, the thread can then process these events. Examples of events are incoming connection, data received etc.</a:t>
+            </a:r>
+            <a:endParaRPr lang="zh-CN" altLang="en-US"/>
+          </a:p>
+        </p:txBody>
+      </p:sp>
+    </p:spTree>
+  </p:cSld>
+  <p:clrMapOvr>
+    <a:masterClrMapping/>
+  </p:clrMapOvr>
+</p:sld>
+</file>
+
+<file path=ppt/slides/slide5.xml><?xml version="1.0" encoding="utf-8"?>
+<p:sld xmlns:a="http://schemas.openxmlformats.org/drawingml/2006/main" xmlns:r="http://schemas.openxmlformats.org/officeDocument/2006/relationships" xmlns:p="http://schemas.openxmlformats.org/presentationml/2006/main">
+  <p:cSld>
+    <p:spTree>
+      <p:nvGrpSpPr>
+        <p:cNvPr id="1" name=""/>
+        <p:cNvGrpSpPr/>
+        <p:nvPr/>
+      </p:nvGrpSpPr>
+      <p:grpSpPr/>
+      <p:sp>
+        <p:nvSpPr>
+          <p:cNvPr id="2" name="标题 1"/>
+          <p:cNvSpPr>
+            <a:spLocks noGrp="1"/>
+          </p:cNvSpPr>
+          <p:nvPr>
+            <p:ph type="title"/>
+          </p:nvPr>
+        </p:nvSpPr>
+        <p:spPr/>
+        <p:txBody>
+          <a:bodyPr/>
+          <a:p>
+            <a:r>
+              <a:rPr lang="en-US" altLang="zh-CN"/>
+              <a:t>Java NIO Channel</a:t>
+            </a:r>
+            <a:endParaRPr lang="en-US" altLang="zh-CN"/>
+          </a:p>
+        </p:txBody>
+      </p:sp>
       <p:sp>
         <p:nvSpPr>
           <p:cNvPr id="3" name="内容占位符 2"/>
@@ -3333,7 +3828,591 @@
         <p:txBody>
           <a:bodyPr/>
           <a:p>
-            <a:endParaRPr lang="zh-CN" altLang="en-US"/>
+            <a:r>
+              <a:rPr lang="zh-CN" altLang="en-US"/>
+              <a:t>You can both read and write to a Channels. Streams are typically one-way (read or write).</a:t>
+            </a:r>
+            <a:endParaRPr lang="zh-CN" altLang="en-US"/>
+          </a:p>
+          <a:p>
+            <a:r>
+              <a:rPr lang="zh-CN" altLang="en-US"/>
+              <a:t>Channels can be read and written asynchronously.</a:t>
+            </a:r>
+            <a:endParaRPr lang="zh-CN" altLang="en-US"/>
+          </a:p>
+          <a:p>
+            <a:r>
+              <a:rPr lang="zh-CN" altLang="en-US"/>
+              <a:t>Channels always read to, or write from, a Buffer.</a:t>
+            </a:r>
+            <a:endParaRPr lang="zh-CN" altLang="en-US"/>
+          </a:p>
+        </p:txBody>
+      </p:sp>
+    </p:spTree>
+  </p:cSld>
+  <p:clrMapOvr>
+    <a:masterClrMapping/>
+  </p:clrMapOvr>
+</p:sld>
+</file>
+
+<file path=ppt/slides/slide6.xml><?xml version="1.0" encoding="utf-8"?>
+<p:sld xmlns:a="http://schemas.openxmlformats.org/drawingml/2006/main" xmlns:r="http://schemas.openxmlformats.org/officeDocument/2006/relationships" xmlns:p="http://schemas.openxmlformats.org/presentationml/2006/main">
+  <p:cSld>
+    <p:spTree>
+      <p:nvGrpSpPr>
+        <p:cNvPr id="1" name=""/>
+        <p:cNvGrpSpPr/>
+        <p:nvPr/>
+      </p:nvGrpSpPr>
+      <p:grpSpPr/>
+      <p:sp>
+        <p:nvSpPr>
+          <p:cNvPr id="2" name="标题 1"/>
+          <p:cNvSpPr>
+            <a:spLocks noGrp="1"/>
+          </p:cNvSpPr>
+          <p:nvPr>
+            <p:ph type="title"/>
+          </p:nvPr>
+        </p:nvSpPr>
+        <p:spPr/>
+        <p:txBody>
+          <a:bodyPr/>
+          <a:p>
+            <a:r>
+              <a:rPr lang="en-US" altLang="zh-CN"/>
+              <a:t>Java NIO Buffer</a:t>
+            </a:r>
+            <a:endParaRPr lang="en-US" altLang="zh-CN"/>
+          </a:p>
+        </p:txBody>
+      </p:sp>
+      <p:sp>
+        <p:nvSpPr>
+          <p:cNvPr id="3" name="内容占位符 2"/>
+          <p:cNvSpPr>
+            <a:spLocks noGrp="1"/>
+          </p:cNvSpPr>
+          <p:nvPr>
+            <p:ph idx="1"/>
+          </p:nvPr>
+        </p:nvSpPr>
+        <p:spPr/>
+        <p:txBody>
+          <a:bodyPr/>
+          <a:p>
+            <a:pPr marL="0" indent="0">
+              <a:buNone/>
+            </a:pPr>
+            <a:r>
+              <a:rPr lang="zh-CN" altLang="en-US"/>
+              <a:t>A buffer is essentially a block of memory</a:t>
+            </a:r>
+            <a:r>
+              <a:rPr lang="en-US" altLang="zh-CN"/>
+              <a:t>.</a:t>
+            </a:r>
+            <a:endParaRPr lang="en-US" altLang="zh-CN"/>
+          </a:p>
+          <a:p>
+            <a:endParaRPr lang="en-US" altLang="zh-CN"/>
+          </a:p>
+          <a:p>
+            <a:r>
+              <a:rPr lang="en-US" altLang="zh-CN"/>
+              <a:t>Write data into the Buffer</a:t>
+            </a:r>
+            <a:endParaRPr lang="en-US" altLang="zh-CN"/>
+          </a:p>
+          <a:p>
+            <a:r>
+              <a:rPr lang="en-US" altLang="zh-CN"/>
+              <a:t>Call buffer.flip()</a:t>
+            </a:r>
+            <a:endParaRPr lang="en-US" altLang="zh-CN"/>
+          </a:p>
+          <a:p>
+            <a:r>
+              <a:rPr lang="en-US" altLang="zh-CN"/>
+              <a:t>Read data out of the Buffer</a:t>
+            </a:r>
+            <a:endParaRPr lang="en-US" altLang="zh-CN"/>
+          </a:p>
+          <a:p>
+            <a:r>
+              <a:rPr lang="en-US" altLang="zh-CN"/>
+              <a:t>Call buffer.clear() or buffer.compact()</a:t>
+            </a:r>
+            <a:endParaRPr lang="en-US" altLang="zh-CN"/>
+          </a:p>
+        </p:txBody>
+      </p:sp>
+    </p:spTree>
+  </p:cSld>
+  <p:clrMapOvr>
+    <a:masterClrMapping/>
+  </p:clrMapOvr>
+</p:sld>
+</file>
+
+<file path=ppt/slides/slide7.xml><?xml version="1.0" encoding="utf-8"?>
+<p:sld xmlns:a="http://schemas.openxmlformats.org/drawingml/2006/main" xmlns:r="http://schemas.openxmlformats.org/officeDocument/2006/relationships" xmlns:p="http://schemas.openxmlformats.org/presentationml/2006/main">
+  <p:cSld>
+    <p:spTree>
+      <p:nvGrpSpPr>
+        <p:cNvPr id="1" name=""/>
+        <p:cNvGrpSpPr/>
+        <p:nvPr/>
+      </p:nvGrpSpPr>
+      <p:grpSpPr/>
+      <p:sp>
+        <p:nvSpPr>
+          <p:cNvPr id="2" name="标题 1"/>
+          <p:cNvSpPr>
+            <a:spLocks noGrp="1"/>
+          </p:cNvSpPr>
+          <p:nvPr>
+            <p:ph type="title"/>
+          </p:nvPr>
+        </p:nvSpPr>
+        <p:spPr/>
+        <p:txBody>
+          <a:bodyPr/>
+          <a:p>
+            <a:r>
+              <a:rPr lang="en-US" altLang="zh-CN"/>
+              <a:t>Java NIO Buffer</a:t>
+            </a:r>
+            <a:endParaRPr lang="en-US" altLang="zh-CN"/>
+          </a:p>
+        </p:txBody>
+      </p:sp>
+      <p:pic>
+        <p:nvPicPr>
+          <p:cNvPr id="5" name="内容占位符 4"/>
+          <p:cNvPicPr>
+            <a:picLocks noChangeAspect="1"/>
+          </p:cNvPicPr>
+          <p:nvPr>
+            <p:ph idx="1"/>
+          </p:nvPr>
+        </p:nvPicPr>
+        <p:blipFill>
+          <a:blip r:embed="rId1"/>
+          <a:stretch>
+            <a:fillRect/>
+          </a:stretch>
+        </p:blipFill>
+        <p:spPr>
+          <a:xfrm>
+            <a:off x="838200" y="1691005"/>
+            <a:ext cx="6426200" cy="4343400"/>
+          </a:xfrm>
+          <a:prstGeom prst="rect">
+            <a:avLst/>
+          </a:prstGeom>
+        </p:spPr>
+      </p:pic>
+    </p:spTree>
+  </p:cSld>
+  <p:clrMapOvr>
+    <a:masterClrMapping/>
+  </p:clrMapOvr>
+</p:sld>
+</file>
+
+<file path=ppt/slides/slide8.xml><?xml version="1.0" encoding="utf-8"?>
+<p:sld xmlns:a="http://schemas.openxmlformats.org/drawingml/2006/main" xmlns:r="http://schemas.openxmlformats.org/officeDocument/2006/relationships" xmlns:p="http://schemas.openxmlformats.org/presentationml/2006/main">
+  <p:cSld>
+    <p:spTree>
+      <p:nvGrpSpPr>
+        <p:cNvPr id="1" name=""/>
+        <p:cNvGrpSpPr/>
+        <p:nvPr/>
+      </p:nvGrpSpPr>
+      <p:grpSpPr/>
+      <p:sp>
+        <p:nvSpPr>
+          <p:cNvPr id="2" name="标题 1"/>
+          <p:cNvSpPr>
+            <a:spLocks noGrp="1"/>
+          </p:cNvSpPr>
+          <p:nvPr>
+            <p:ph type="title"/>
+          </p:nvPr>
+        </p:nvSpPr>
+        <p:spPr/>
+        <p:txBody>
+          <a:bodyPr/>
+          <a:p>
+            <a:r>
+              <a:rPr lang="en-US" altLang="zh-CN"/>
+              <a:t>Java NIO Buffer</a:t>
+            </a:r>
+            <a:endParaRPr lang="en-US" altLang="zh-CN"/>
+          </a:p>
+        </p:txBody>
+      </p:sp>
+      <p:sp>
+        <p:nvSpPr>
+          <p:cNvPr id="3" name="内容占位符 2"/>
+          <p:cNvSpPr>
+            <a:spLocks noGrp="1"/>
+          </p:cNvSpPr>
+          <p:nvPr>
+            <p:ph idx="1"/>
+          </p:nvPr>
+        </p:nvSpPr>
+        <p:spPr>
+          <a:xfrm>
+            <a:off x="838200" y="1825625"/>
+            <a:ext cx="3672205" cy="4351655"/>
+          </a:xfrm>
+        </p:spPr>
+        <p:txBody>
+          <a:bodyPr/>
+          <a:p>
+            <a:r>
+              <a:t>ByteBuffer</a:t>
+            </a:r>
+          </a:p>
+          <a:p>
+            <a:r>
+              <a:t>MappedByteBuffer</a:t>
+            </a:r>
+          </a:p>
+          <a:p>
+            <a:r>
+              <a:t>CharBuffer</a:t>
+            </a:r>
+          </a:p>
+          <a:p>
+            <a:r>
+              <a:t>DoubleBuffer</a:t>
+            </a:r>
+          </a:p>
+          <a:p>
+            <a:r>
+              <a:t>FloatBuffer</a:t>
+            </a:r>
+          </a:p>
+          <a:p>
+            <a:r>
+              <a:t>IntBuffer</a:t>
+            </a:r>
+          </a:p>
+          <a:p>
+            <a:r>
+              <a:t>LongBuffer</a:t>
+            </a:r>
+          </a:p>
+          <a:p>
+            <a:r>
+              <a:t>ShortBuffer</a:t>
+            </a:r>
+          </a:p>
+        </p:txBody>
+      </p:sp>
+      <p:sp>
+        <p:nvSpPr>
+          <p:cNvPr id="4" name="内容占位符 2"/>
+          <p:cNvSpPr>
+            <a:spLocks noGrp="1"/>
+          </p:cNvSpPr>
+          <p:nvPr/>
+        </p:nvSpPr>
+        <p:spPr>
+          <a:xfrm>
+            <a:off x="4311015" y="1825625"/>
+            <a:ext cx="7042785" cy="4351655"/>
+          </a:xfrm>
+          <a:prstGeom prst="rect">
+            <a:avLst/>
+          </a:prstGeom>
+        </p:spPr>
+        <p:txBody>
+          <a:bodyPr vert="horz" lIns="91440" tIns="45720" rIns="91440" bIns="45720" rtlCol="0">
+            <a:normAutofit/>
+          </a:bodyPr>
+          <a:lstStyle>
+            <a:lvl1pPr marL="228600" indent="-228600" algn="l" defTabSz="914400" rtl="0" eaLnBrk="1" latinLnBrk="0" hangingPunct="1">
+              <a:lnSpc>
+                <a:spcPct val="90000"/>
+              </a:lnSpc>
+              <a:spcBef>
+                <a:spcPts val="1000"/>
+              </a:spcBef>
+              <a:buFont typeface="Arial" panose="020B0604020202020204" pitchFamily="34" charset="0"/>
+              <a:buChar char="•"/>
+              <a:defRPr sz="2800" kern="1200">
+                <a:solidFill>
+                  <a:schemeClr val="tx1"/>
+                </a:solidFill>
+                <a:latin typeface="+mn-lt"/>
+                <a:ea typeface="+mn-ea"/>
+                <a:cs typeface="+mn-cs"/>
+              </a:defRPr>
+            </a:lvl1pPr>
+            <a:lvl2pPr marL="685800" indent="-228600" algn="l" defTabSz="914400" rtl="0" eaLnBrk="1" latinLnBrk="0" hangingPunct="1">
+              <a:lnSpc>
+                <a:spcPct val="90000"/>
+              </a:lnSpc>
+              <a:spcBef>
+                <a:spcPts val="500"/>
+              </a:spcBef>
+              <a:buFont typeface="Arial" panose="020B0604020202020204" pitchFamily="34" charset="0"/>
+              <a:buChar char="•"/>
+              <a:defRPr sz="2400" kern="1200">
+                <a:solidFill>
+                  <a:schemeClr val="tx1"/>
+                </a:solidFill>
+                <a:latin typeface="+mn-lt"/>
+                <a:ea typeface="+mn-ea"/>
+                <a:cs typeface="+mn-cs"/>
+              </a:defRPr>
+            </a:lvl2pPr>
+            <a:lvl3pPr marL="1143000" indent="-228600" algn="l" defTabSz="914400" rtl="0" eaLnBrk="1" latinLnBrk="0" hangingPunct="1">
+              <a:lnSpc>
+                <a:spcPct val="90000"/>
+              </a:lnSpc>
+              <a:spcBef>
+                <a:spcPts val="500"/>
+              </a:spcBef>
+              <a:buFont typeface="Arial" panose="020B0604020202020204" pitchFamily="34" charset="0"/>
+              <a:buChar char="•"/>
+              <a:defRPr sz="2000" kern="1200">
+                <a:solidFill>
+                  <a:schemeClr val="tx1"/>
+                </a:solidFill>
+                <a:latin typeface="+mn-lt"/>
+                <a:ea typeface="+mn-ea"/>
+                <a:cs typeface="+mn-cs"/>
+              </a:defRPr>
+            </a:lvl3pPr>
+            <a:lvl4pPr marL="1600200" indent="-228600" algn="l" defTabSz="914400" rtl="0" eaLnBrk="1" latinLnBrk="0" hangingPunct="1">
+              <a:lnSpc>
+                <a:spcPct val="90000"/>
+              </a:lnSpc>
+              <a:spcBef>
+                <a:spcPts val="500"/>
+              </a:spcBef>
+              <a:buFont typeface="Arial" panose="020B0604020202020204" pitchFamily="34" charset="0"/>
+              <a:buChar char="•"/>
+              <a:defRPr sz="1800" kern="1200">
+                <a:solidFill>
+                  <a:schemeClr val="tx1"/>
+                </a:solidFill>
+                <a:latin typeface="+mn-lt"/>
+                <a:ea typeface="+mn-ea"/>
+                <a:cs typeface="+mn-cs"/>
+              </a:defRPr>
+            </a:lvl4pPr>
+            <a:lvl5pPr marL="2057400" indent="-228600" algn="l" defTabSz="914400" rtl="0" eaLnBrk="1" latinLnBrk="0" hangingPunct="1">
+              <a:lnSpc>
+                <a:spcPct val="90000"/>
+              </a:lnSpc>
+              <a:spcBef>
+                <a:spcPts val="500"/>
+              </a:spcBef>
+              <a:buFont typeface="Arial" panose="020B0604020202020204" pitchFamily="34" charset="0"/>
+              <a:buChar char="•"/>
+              <a:defRPr sz="1800" kern="1200">
+                <a:solidFill>
+                  <a:schemeClr val="tx1"/>
+                </a:solidFill>
+                <a:latin typeface="+mn-lt"/>
+                <a:ea typeface="+mn-ea"/>
+                <a:cs typeface="+mn-cs"/>
+              </a:defRPr>
+            </a:lvl5pPr>
+            <a:lvl6pPr marL="2514600" indent="-228600" algn="l" defTabSz="914400" rtl="0" eaLnBrk="1" latinLnBrk="0" hangingPunct="1">
+              <a:lnSpc>
+                <a:spcPct val="90000"/>
+              </a:lnSpc>
+              <a:spcBef>
+                <a:spcPts val="500"/>
+              </a:spcBef>
+              <a:buFont typeface="Arial" panose="020B0604020202020204" pitchFamily="34" charset="0"/>
+              <a:buChar char="•"/>
+              <a:defRPr sz="1800" kern="1200">
+                <a:solidFill>
+                  <a:schemeClr val="tx1"/>
+                </a:solidFill>
+                <a:latin typeface="+mn-lt"/>
+                <a:ea typeface="+mn-ea"/>
+                <a:cs typeface="+mn-cs"/>
+              </a:defRPr>
+            </a:lvl6pPr>
+            <a:lvl7pPr marL="2971800" indent="-228600" algn="l" defTabSz="914400" rtl="0" eaLnBrk="1" latinLnBrk="0" hangingPunct="1">
+              <a:lnSpc>
+                <a:spcPct val="90000"/>
+              </a:lnSpc>
+              <a:spcBef>
+                <a:spcPts val="500"/>
+              </a:spcBef>
+              <a:buFont typeface="Arial" panose="020B0604020202020204" pitchFamily="34" charset="0"/>
+              <a:buChar char="•"/>
+              <a:defRPr sz="1800" kern="1200">
+                <a:solidFill>
+                  <a:schemeClr val="tx1"/>
+                </a:solidFill>
+                <a:latin typeface="+mn-lt"/>
+                <a:ea typeface="+mn-ea"/>
+                <a:cs typeface="+mn-cs"/>
+              </a:defRPr>
+            </a:lvl7pPr>
+            <a:lvl8pPr marL="3429000" indent="-228600" algn="l" defTabSz="914400" rtl="0" eaLnBrk="1" latinLnBrk="0" hangingPunct="1">
+              <a:lnSpc>
+                <a:spcPct val="90000"/>
+              </a:lnSpc>
+              <a:spcBef>
+                <a:spcPts val="500"/>
+              </a:spcBef>
+              <a:buFont typeface="Arial" panose="020B0604020202020204" pitchFamily="34" charset="0"/>
+              <a:buChar char="•"/>
+              <a:defRPr sz="1800" kern="1200">
+                <a:solidFill>
+                  <a:schemeClr val="tx1"/>
+                </a:solidFill>
+                <a:latin typeface="+mn-lt"/>
+                <a:ea typeface="+mn-ea"/>
+                <a:cs typeface="+mn-cs"/>
+              </a:defRPr>
+            </a:lvl8pPr>
+            <a:lvl9pPr marL="3886200" indent="-228600" algn="l" defTabSz="914400" rtl="0" eaLnBrk="1" latinLnBrk="0" hangingPunct="1">
+              <a:lnSpc>
+                <a:spcPct val="90000"/>
+              </a:lnSpc>
+              <a:spcBef>
+                <a:spcPts val="500"/>
+              </a:spcBef>
+              <a:buFont typeface="Arial" panose="020B0604020202020204" pitchFamily="34" charset="0"/>
+              <a:buChar char="•"/>
+              <a:defRPr sz="1800" kern="1200">
+                <a:solidFill>
+                  <a:schemeClr val="tx1"/>
+                </a:solidFill>
+                <a:latin typeface="+mn-lt"/>
+                <a:ea typeface="+mn-ea"/>
+                <a:cs typeface="+mn-cs"/>
+              </a:defRPr>
+            </a:lvl9pPr>
+          </a:lstStyle>
+          <a:p>
+            <a:r>
+              <a:t>ByteBuffer buf = ByteBuffer.allocate(48);</a:t>
+            </a:r>
+          </a:p>
+          <a:p/>
+          <a:p>
+            <a:r>
+              <a:t>int bytesRead = inChannel.read(buf); </a:t>
+            </a:r>
+          </a:p>
+          <a:p>
+            <a:r>
+              <a:t>buf.put(127);  </a:t>
+            </a:r>
+          </a:p>
+          <a:p/>
+          <a:p>
+            <a:r>
+              <a:t>int bytesWritten = inChannel.write(buf);</a:t>
+            </a:r>
+          </a:p>
+          <a:p>
+            <a:r>
+              <a:t>byte aByte = buf.get();  </a:t>
+            </a:r>
+          </a:p>
+        </p:txBody>
+      </p:sp>
+    </p:spTree>
+  </p:cSld>
+  <p:clrMapOvr>
+    <a:masterClrMapping/>
+  </p:clrMapOvr>
+</p:sld>
+</file>
+
+<file path=ppt/slides/slide9.xml><?xml version="1.0" encoding="utf-8"?>
+<p:sld xmlns:a="http://schemas.openxmlformats.org/drawingml/2006/main" xmlns:r="http://schemas.openxmlformats.org/officeDocument/2006/relationships" xmlns:p="http://schemas.openxmlformats.org/presentationml/2006/main">
+  <p:cSld>
+    <p:spTree>
+      <p:nvGrpSpPr>
+        <p:cNvPr id="1" name=""/>
+        <p:cNvGrpSpPr/>
+        <p:nvPr/>
+      </p:nvGrpSpPr>
+      <p:grpSpPr/>
+      <p:sp>
+        <p:nvSpPr>
+          <p:cNvPr id="2" name="标题 1"/>
+          <p:cNvSpPr>
+            <a:spLocks noGrp="1"/>
+          </p:cNvSpPr>
+          <p:nvPr>
+            <p:ph type="title"/>
+          </p:nvPr>
+        </p:nvSpPr>
+        <p:spPr/>
+        <p:txBody>
+          <a:bodyPr/>
+          <a:p>
+            <a:r>
+              <a:rPr lang="en-US" altLang="zh-CN"/>
+              <a:t>Java NIO Buffer</a:t>
+            </a:r>
+            <a:endParaRPr lang="en-US" altLang="zh-CN"/>
+          </a:p>
+        </p:txBody>
+      </p:sp>
+      <p:sp>
+        <p:nvSpPr>
+          <p:cNvPr id="3" name="内容占位符 2"/>
+          <p:cNvSpPr>
+            <a:spLocks noGrp="1"/>
+          </p:cNvSpPr>
+          <p:nvPr>
+            <p:ph idx="1"/>
+          </p:nvPr>
+        </p:nvSpPr>
+        <p:spPr>
+          <a:xfrm>
+            <a:off x="838200" y="1825625"/>
+            <a:ext cx="8893810" cy="4351655"/>
+          </a:xfrm>
+        </p:spPr>
+        <p:txBody>
+          <a:bodyPr/>
+          <a:p>
+            <a:r>
+              <a:t>rewind()</a:t>
+            </a:r>
+          </a:p>
+          <a:p>
+            <a:r>
+              <a:t>clear() and compact()</a:t>
+            </a:r>
+          </a:p>
+          <a:p/>
+          <a:p>
+            <a:r>
+              <a:t>buffer.mark();</a:t>
+            </a:r>
+          </a:p>
+          <a:p>
+            <a:r>
+              <a:t>//call buffer.get() a couple of times, e.g. during parsing.</a:t>
+            </a:r>
+          </a:p>
+          <a:p>
+            <a:r>
+              <a:t>buffer.reset();  //set position back to mark.    </a:t>
+            </a:r>
           </a:p>
         </p:txBody>
       </p:sp>

</xml_diff>